<commit_message>
add slide reminder for attendance
</commit_message>
<xml_diff>
--- a/lessons/class1/Class1A_Intros.pptx
+++ b/lessons/class1/Class1A_Intros.pptx
@@ -5,17 +5,18 @@
     <p:sldMasterId id="2147483660" r:id="rId1"/>
   </p:sldMasterIdLst>
   <p:notesMasterIdLst>
-    <p:notesMasterId r:id="rId10"/>
+    <p:notesMasterId r:id="rId11"/>
   </p:notesMasterIdLst>
   <p:sldIdLst>
     <p:sldId id="593" r:id="rId2"/>
-    <p:sldId id="752" r:id="rId3"/>
-    <p:sldId id="740" r:id="rId4"/>
-    <p:sldId id="632" r:id="rId5"/>
-    <p:sldId id="741" r:id="rId6"/>
-    <p:sldId id="742" r:id="rId7"/>
-    <p:sldId id="743" r:id="rId8"/>
-    <p:sldId id="753" r:id="rId9"/>
+    <p:sldId id="754" r:id="rId3"/>
+    <p:sldId id="752" r:id="rId4"/>
+    <p:sldId id="740" r:id="rId5"/>
+    <p:sldId id="632" r:id="rId6"/>
+    <p:sldId id="741" r:id="rId7"/>
+    <p:sldId id="742" r:id="rId8"/>
+    <p:sldId id="743" r:id="rId9"/>
+    <p:sldId id="753" r:id="rId10"/>
   </p:sldIdLst>
   <p:sldSz cx="9144000" cy="6858000" type="screen4x3"/>
   <p:notesSz cx="6858000" cy="9144000"/>
@@ -221,7 +222,7 @@
           <a:p>
             <a:fld id="{B0C0A60C-850A-4EA4-9C14-A8FE98B94505}" type="datetimeFigureOut">
               <a:rPr lang="en-US" smtClean="0"/>
-              <a:t>12/30/20</a:t>
+              <a:t>1/10/21</a:t>
             </a:fld>
             <a:endParaRPr lang="en-US"/>
           </a:p>
@@ -620,7 +621,7 @@
           <a:p>
             <a:fld id="{5738B90E-0779-4C36-915C-6F05FCD89456}" type="datetime1">
               <a:rPr lang="en-US" smtClean="0"/>
-              <a:t>12/30/20</a:t>
+              <a:t>1/10/21</a:t>
             </a:fld>
             <a:endParaRPr lang="en-US"/>
           </a:p>
@@ -800,7 +801,7 @@
           <a:p>
             <a:fld id="{7B9EA29D-D431-42FE-B7B6-AAE4454C77D3}" type="datetime1">
               <a:rPr lang="en-US" smtClean="0"/>
-              <a:t>12/30/20</a:t>
+              <a:t>1/10/21</a:t>
             </a:fld>
             <a:endParaRPr lang="en-US"/>
           </a:p>
@@ -1057,7 +1058,7 @@
           <a:p>
             <a:fld id="{690D8A1E-EA8F-46C1-B891-AE0C00D9C314}" type="datetime1">
               <a:rPr lang="en-US" smtClean="0"/>
-              <a:t>12/30/20</a:t>
+              <a:t>1/10/21</a:t>
             </a:fld>
             <a:endParaRPr lang="en-US"/>
           </a:p>
@@ -1348,7 +1349,7 @@
           <a:p>
             <a:fld id="{D753EFC8-4232-4598-94F6-94C0EBAFC469}" type="datetime1">
               <a:rPr lang="en-US" smtClean="0"/>
-              <a:t>12/30/20</a:t>
+              <a:t>1/10/21</a:t>
             </a:fld>
             <a:endParaRPr lang="en-US"/>
           </a:p>
@@ -1660,7 +1661,7 @@
           <a:p>
             <a:fld id="{F3161074-1C18-4AE7-957D-F18524378C85}" type="datetime1">
               <a:rPr lang="en-US" smtClean="0"/>
-              <a:t>12/30/20</a:t>
+              <a:t>1/10/21</a:t>
             </a:fld>
             <a:endParaRPr lang="en-US"/>
           </a:p>
@@ -1896,7 +1897,7 @@
           <a:p>
             <a:fld id="{69BE256C-8D9A-4404-B47D-41A1AE514425}" type="datetime1">
               <a:rPr lang="en-US" smtClean="0"/>
-              <a:t>12/30/20</a:t>
+              <a:t>1/10/21</a:t>
             </a:fld>
             <a:endParaRPr lang="en-US"/>
           </a:p>
@@ -2327,7 +2328,7 @@
           <a:p>
             <a:fld id="{66CB2154-9035-4012-8189-BAAB61C5A5EE}" type="datetime1">
               <a:rPr lang="en-US" smtClean="0"/>
-              <a:t>12/30/20</a:t>
+              <a:t>1/10/21</a:t>
             </a:fld>
             <a:endParaRPr lang="en-US"/>
           </a:p>
@@ -2498,7 +2499,7 @@
           <a:p>
             <a:fld id="{6700A58B-DD98-43D0-B791-721480A02982}" type="datetime1">
               <a:rPr lang="en-US" smtClean="0"/>
-              <a:t>12/30/20</a:t>
+              <a:t>1/10/21</a:t>
             </a:fld>
             <a:endParaRPr lang="en-US"/>
           </a:p>
@@ -2687,7 +2688,7 @@
           <a:p>
             <a:fld id="{7DB6E382-4F61-4E24-BE1A-377EC83D0E3A}" type="datetime1">
               <a:rPr lang="en-US" smtClean="0"/>
-              <a:t>12/30/20</a:t>
+              <a:t>1/10/21</a:t>
             </a:fld>
             <a:endParaRPr lang="en-US"/>
           </a:p>
@@ -2995,7 +2996,7 @@
           <a:p>
             <a:fld id="{4142EED6-FC16-45B9-B8C4-2BC5DBA88325}" type="datetime1">
               <a:rPr lang="en-US" smtClean="0"/>
-              <a:t>12/30/20</a:t>
+              <a:t>1/10/21</a:t>
             </a:fld>
             <a:endParaRPr lang="en-US"/>
           </a:p>
@@ -3310,7 +3311,7 @@
           <a:p>
             <a:fld id="{DF59512B-4F1D-43D7-8819-2F53FEF69650}" type="datetime1">
               <a:rPr lang="en-US" smtClean="0"/>
-              <a:t>12/30/20</a:t>
+              <a:t>1/10/21</a:t>
             </a:fld>
             <a:endParaRPr lang="en-US"/>
           </a:p>
@@ -3583,7 +3584,7 @@
           <a:p>
             <a:fld id="{08437B94-E2BF-44DC-ADC5-B05FC9934E9D}" type="datetime1">
               <a:rPr lang="en-US" smtClean="0"/>
-              <a:t>12/30/20</a:t>
+              <a:t>1/10/21</a:t>
             </a:fld>
             <a:endParaRPr lang="en-US"/>
           </a:p>
@@ -4067,7 +4068,7 @@
           <a:p>
             <a:fld id="{5738B90E-0779-4C36-915C-6F05FCD89456}" type="datetime1">
               <a:rPr lang="en-US" smtClean="0"/>
-              <a:t>12/30/20</a:t>
+              <a:t>1/10/21</a:t>
             </a:fld>
             <a:endParaRPr lang="en-US"/>
           </a:p>
@@ -4236,6 +4237,195 @@
       </p:grpSpPr>
       <p:sp>
         <p:nvSpPr>
+          <p:cNvPr id="2" name="Title 1">
+            <a:extLst>
+              <a:ext uri="{FF2B5EF4-FFF2-40B4-BE49-F238E27FC236}">
+                <a16:creationId xmlns:a16="http://schemas.microsoft.com/office/drawing/2014/main" id="{B5D6A79E-3446-0546-9AF5-D476D4580F3E}"/>
+              </a:ext>
+            </a:extLst>
+          </p:cNvPr>
+          <p:cNvSpPr>
+            <a:spLocks noGrp="1"/>
+          </p:cNvSpPr>
+          <p:nvPr>
+            <p:ph type="title"/>
+          </p:nvPr>
+        </p:nvSpPr>
+        <p:spPr/>
+        <p:txBody>
+          <a:bodyPr/>
+          <a:lstStyle/>
+          <a:p>
+            <a:endParaRPr lang="en-US"/>
+          </a:p>
+        </p:txBody>
+      </p:sp>
+      <p:sp>
+        <p:nvSpPr>
+          <p:cNvPr id="4" name="Date Placeholder 3">
+            <a:extLst>
+              <a:ext uri="{FF2B5EF4-FFF2-40B4-BE49-F238E27FC236}">
+                <a16:creationId xmlns:a16="http://schemas.microsoft.com/office/drawing/2014/main" id="{BC156EF1-9A4F-9F45-8FF4-800064DE9865}"/>
+              </a:ext>
+            </a:extLst>
+          </p:cNvPr>
+          <p:cNvSpPr>
+            <a:spLocks noGrp="1"/>
+          </p:cNvSpPr>
+          <p:nvPr>
+            <p:ph type="dt" sz="half" idx="10"/>
+          </p:nvPr>
+        </p:nvSpPr>
+        <p:spPr/>
+        <p:txBody>
+          <a:bodyPr/>
+          <a:lstStyle/>
+          <a:p>
+            <a:fld id="{D753EFC8-4232-4598-94F6-94C0EBAFC469}" type="datetime1">
+              <a:rPr lang="en-US" smtClean="0"/>
+              <a:t>1/10/21</a:t>
+            </a:fld>
+            <a:endParaRPr lang="en-US"/>
+          </a:p>
+        </p:txBody>
+      </p:sp>
+      <p:sp>
+        <p:nvSpPr>
+          <p:cNvPr id="5" name="Slide Number Placeholder 4">
+            <a:extLst>
+              <a:ext uri="{FF2B5EF4-FFF2-40B4-BE49-F238E27FC236}">
+                <a16:creationId xmlns:a16="http://schemas.microsoft.com/office/drawing/2014/main" id="{9C58DC03-3C03-554C-AF7B-FFECAEA0F6CA}"/>
+              </a:ext>
+            </a:extLst>
+          </p:cNvPr>
+          <p:cNvSpPr>
+            <a:spLocks noGrp="1"/>
+          </p:cNvSpPr>
+          <p:nvPr>
+            <p:ph type="sldNum" sz="quarter" idx="12"/>
+          </p:nvPr>
+        </p:nvSpPr>
+        <p:spPr/>
+        <p:txBody>
+          <a:bodyPr/>
+          <a:lstStyle/>
+          <a:p>
+            <a:fld id="{37290FF7-652B-4475-AEAB-8B1A5D23AE09}" type="slidenum">
+              <a:rPr lang="en-US" smtClean="0"/>
+              <a:t>2</a:t>
+            </a:fld>
+            <a:endParaRPr lang="en-US"/>
+          </a:p>
+        </p:txBody>
+      </p:sp>
+      <p:sp>
+        <p:nvSpPr>
+          <p:cNvPr id="6" name="Footer Placeholder 5">
+            <a:extLst>
+              <a:ext uri="{FF2B5EF4-FFF2-40B4-BE49-F238E27FC236}">
+                <a16:creationId xmlns:a16="http://schemas.microsoft.com/office/drawing/2014/main" id="{0240561B-B766-AD4C-9CA7-CB95F239A470}"/>
+              </a:ext>
+            </a:extLst>
+          </p:cNvPr>
+          <p:cNvSpPr>
+            <a:spLocks noGrp="1"/>
+          </p:cNvSpPr>
+          <p:nvPr>
+            <p:ph type="ftr" sz="quarter" idx="3"/>
+          </p:nvPr>
+        </p:nvSpPr>
+        <p:spPr/>
+        <p:txBody>
+          <a:bodyPr/>
+          <a:lstStyle/>
+          <a:p>
+            <a:r>
+              <a:rPr lang="en-US"/>
+              <a:t>Kwartler</a:t>
+            </a:r>
+            <a:endParaRPr lang="en-US" dirty="0"/>
+          </a:p>
+        </p:txBody>
+      </p:sp>
+      <p:pic>
+        <p:nvPicPr>
+          <p:cNvPr id="1026" name="Picture 2" descr="No LOL Here Attendance Cat Meme - Cat Planet | Cat Planet">
+            <a:extLst>
+              <a:ext uri="{FF2B5EF4-FFF2-40B4-BE49-F238E27FC236}">
+                <a16:creationId xmlns:a16="http://schemas.microsoft.com/office/drawing/2014/main" id="{17A9BD53-FC5D-2E46-8D31-694778C83DD6}"/>
+              </a:ext>
+            </a:extLst>
+          </p:cNvPr>
+          <p:cNvPicPr>
+            <a:picLocks noChangeAspect="1" noChangeArrowheads="1"/>
+          </p:cNvPicPr>
+          <p:nvPr/>
+        </p:nvPicPr>
+        <p:blipFill>
+          <a:blip r:embed="rId2">
+            <a:extLst>
+              <a:ext uri="{28A0092B-C50C-407E-A947-70E740481C1C}">
+                <a14:useLocalDpi xmlns:a14="http://schemas.microsoft.com/office/drawing/2010/main" val="0"/>
+              </a:ext>
+            </a:extLst>
+          </a:blip>
+          <a:srcRect/>
+          <a:stretch>
+            <a:fillRect/>
+          </a:stretch>
+        </p:blipFill>
+        <p:spPr bwMode="auto">
+          <a:xfrm>
+            <a:off x="1143000" y="0"/>
+            <a:ext cx="6858000" cy="6858000"/>
+          </a:xfrm>
+          <a:prstGeom prst="rect">
+            <a:avLst/>
+          </a:prstGeom>
+          <a:noFill/>
+          <a:extLst>
+            <a:ext uri="{909E8E84-426E-40DD-AFC4-6F175D3DCCD1}">
+              <a14:hiddenFill xmlns:a14="http://schemas.microsoft.com/office/drawing/2010/main">
+                <a:solidFill>
+                  <a:srgbClr val="FFFFFF"/>
+                </a:solidFill>
+              </a14:hiddenFill>
+            </a:ext>
+          </a:extLst>
+        </p:spPr>
+      </p:pic>
+    </p:spTree>
+    <p:extLst>
+      <p:ext uri="{BB962C8B-B14F-4D97-AF65-F5344CB8AC3E}">
+        <p14:creationId xmlns:p14="http://schemas.microsoft.com/office/powerpoint/2010/main" val="1340460646"/>
+      </p:ext>
+    </p:extLst>
+  </p:cSld>
+  <p:clrMapOvr>
+    <a:masterClrMapping/>
+  </p:clrMapOvr>
+</p:sld>
+</file>
+
+<file path=ppt/slides/slide3.xml><?xml version="1.0" encoding="utf-8"?>
+<p:sld xmlns:a="http://schemas.openxmlformats.org/drawingml/2006/main" xmlns:r="http://schemas.openxmlformats.org/officeDocument/2006/relationships" xmlns:p="http://schemas.openxmlformats.org/presentationml/2006/main">
+  <p:cSld>
+    <p:spTree>
+      <p:nvGrpSpPr>
+        <p:cNvPr id="1" name=""/>
+        <p:cNvGrpSpPr/>
+        <p:nvPr/>
+      </p:nvGrpSpPr>
+      <p:grpSpPr>
+        <a:xfrm>
+          <a:off x="0" y="0"/>
+          <a:ext cx="0" cy="0"/>
+          <a:chOff x="0" y="0"/>
+          <a:chExt cx="0" cy="0"/>
+        </a:xfrm>
+      </p:grpSpPr>
+      <p:sp>
+        <p:nvSpPr>
           <p:cNvPr id="2" name="Date Placeholder 1">
             <a:extLst>
               <a:ext uri="{FF2B5EF4-FFF2-40B4-BE49-F238E27FC236}">
@@ -4257,7 +4447,7 @@
           <a:p>
             <a:fld id="{7DB6E382-4F61-4E24-BE1A-377EC83D0E3A}" type="datetime1">
               <a:rPr lang="en-US" smtClean="0"/>
-              <a:t>12/30/20</a:t>
+              <a:t>1/10/21</a:t>
             </a:fld>
             <a:endParaRPr lang="en-US"/>
           </a:p>
@@ -4286,7 +4476,7 @@
           <a:p>
             <a:fld id="{37290FF7-652B-4475-AEAB-8B1A5D23AE09}" type="slidenum">
               <a:rPr lang="en-US" smtClean="0"/>
-              <a:t>2</a:t>
+              <a:t>3</a:t>
             </a:fld>
             <a:endParaRPr lang="en-US"/>
           </a:p>
@@ -5202,7 +5392,7 @@
 </p:sld>
 </file>
 
-<file path=ppt/slides/slide3.xml><?xml version="1.0" encoding="utf-8"?>
+<file path=ppt/slides/slide4.xml><?xml version="1.0" encoding="utf-8"?>
 <p:sld xmlns:a="http://schemas.openxmlformats.org/drawingml/2006/main" xmlns:r="http://schemas.openxmlformats.org/officeDocument/2006/relationships" xmlns:p="http://schemas.openxmlformats.org/presentationml/2006/main">
   <p:cSld>
     <p:spTree>
@@ -5242,7 +5432,7 @@
           <a:p>
             <a:fld id="{6700A58B-DD98-43D0-B791-721480A02982}" type="datetime1">
               <a:rPr lang="en-US" smtClean="0"/>
-              <a:t>12/30/20</a:t>
+              <a:t>1/10/21</a:t>
             </a:fld>
             <a:endParaRPr lang="en-US"/>
           </a:p>
@@ -5304,7 +5494,7 @@
           <a:p>
             <a:fld id="{37290FF7-652B-4475-AEAB-8B1A5D23AE09}" type="slidenum">
               <a:rPr lang="en-US" smtClean="0"/>
-              <a:t>3</a:t>
+              <a:t>4</a:t>
             </a:fld>
             <a:endParaRPr lang="en-US"/>
           </a:p>
@@ -5497,7 +5687,7 @@
 </p:sld>
 </file>
 
-<file path=ppt/slides/slide4.xml><?xml version="1.0" encoding="utf-8"?>
+<file path=ppt/slides/slide5.xml><?xml version="1.0" encoding="utf-8"?>
 <p:sld xmlns:a="http://schemas.openxmlformats.org/drawingml/2006/main" xmlns:r="http://schemas.openxmlformats.org/officeDocument/2006/relationships" xmlns:p="http://schemas.openxmlformats.org/presentationml/2006/main">
   <p:cSld>
     <p:spTree>
@@ -5531,7 +5721,7 @@
           <a:p>
             <a:fld id="{6700A58B-DD98-43D0-B791-721480A02982}" type="datetime1">
               <a:rPr lang="en-US" smtClean="0"/>
-              <a:t>12/30/20</a:t>
+              <a:t>1/10/21</a:t>
             </a:fld>
             <a:endParaRPr lang="en-US"/>
           </a:p>
@@ -5576,7 +5766,7 @@
           <a:p>
             <a:fld id="{37290FF7-652B-4475-AEAB-8B1A5D23AE09}" type="slidenum">
               <a:rPr lang="en-US" smtClean="0"/>
-              <a:t>4</a:t>
+              <a:t>5</a:t>
             </a:fld>
             <a:endParaRPr lang="en-US"/>
           </a:p>
@@ -6399,7 +6589,7 @@
 </p:sld>
 </file>
 
-<file path=ppt/slides/slide5.xml><?xml version="1.0" encoding="utf-8"?>
+<file path=ppt/slides/slide6.xml><?xml version="1.0" encoding="utf-8"?>
 <p:sld xmlns:a="http://schemas.openxmlformats.org/drawingml/2006/main" xmlns:r="http://schemas.openxmlformats.org/officeDocument/2006/relationships" xmlns:p="http://schemas.openxmlformats.org/presentationml/2006/main">
   <p:cSld>
     <p:spTree>
@@ -6433,7 +6623,7 @@
           <a:p>
             <a:fld id="{6700A58B-DD98-43D0-B791-721480A02982}" type="datetime1">
               <a:rPr lang="en-US" smtClean="0"/>
-              <a:t>12/30/20</a:t>
+              <a:t>1/10/21</a:t>
             </a:fld>
             <a:endParaRPr lang="en-US"/>
           </a:p>
@@ -6478,7 +6668,7 @@
           <a:p>
             <a:fld id="{37290FF7-652B-4475-AEAB-8B1A5D23AE09}" type="slidenum">
               <a:rPr lang="en-US" smtClean="0"/>
-              <a:t>5</a:t>
+              <a:t>6</a:t>
             </a:fld>
             <a:endParaRPr lang="en-US"/>
           </a:p>
@@ -6872,7 +7062,7 @@
 </p:sld>
 </file>
 
-<file path=ppt/slides/slide6.xml><?xml version="1.0" encoding="utf-8"?>
+<file path=ppt/slides/slide7.xml><?xml version="1.0" encoding="utf-8"?>
 <p:sld xmlns:a="http://schemas.openxmlformats.org/drawingml/2006/main" xmlns:r="http://schemas.openxmlformats.org/officeDocument/2006/relationships" xmlns:p="http://schemas.openxmlformats.org/presentationml/2006/main">
   <p:cSld>
     <p:spTree>
@@ -6906,7 +7096,7 @@
           <a:p>
             <a:fld id="{6700A58B-DD98-43D0-B791-721480A02982}" type="datetime1">
               <a:rPr lang="en-US" smtClean="0"/>
-              <a:t>12/30/20</a:t>
+              <a:t>1/10/21</a:t>
             </a:fld>
             <a:endParaRPr lang="en-US" dirty="0"/>
           </a:p>
@@ -6951,7 +7141,7 @@
           <a:p>
             <a:fld id="{37290FF7-652B-4475-AEAB-8B1A5D23AE09}" type="slidenum">
               <a:rPr lang="en-US" smtClean="0"/>
-              <a:t>6</a:t>
+              <a:t>7</a:t>
             </a:fld>
             <a:endParaRPr lang="en-US"/>
           </a:p>
@@ -7499,7 +7689,7 @@
 </p:sld>
 </file>
 
-<file path=ppt/slides/slide7.xml><?xml version="1.0" encoding="utf-8"?>
+<file path=ppt/slides/slide8.xml><?xml version="1.0" encoding="utf-8"?>
 <p:sld xmlns:a="http://schemas.openxmlformats.org/drawingml/2006/main" xmlns:r="http://schemas.openxmlformats.org/officeDocument/2006/relationships" xmlns:p="http://schemas.openxmlformats.org/presentationml/2006/main">
   <p:cSld>
     <p:spTree>
@@ -7533,7 +7723,7 @@
           <a:p>
             <a:fld id="{6700A58B-DD98-43D0-B791-721480A02982}" type="datetime1">
               <a:rPr lang="en-US" smtClean="0"/>
-              <a:t>12/30/20</a:t>
+              <a:t>1/10/21</a:t>
             </a:fld>
             <a:endParaRPr lang="en-US"/>
           </a:p>
@@ -7578,7 +7768,7 @@
           <a:p>
             <a:fld id="{37290FF7-652B-4475-AEAB-8B1A5D23AE09}" type="slidenum">
               <a:rPr lang="en-US" smtClean="0"/>
-              <a:t>7</a:t>
+              <a:t>8</a:t>
             </a:fld>
             <a:endParaRPr lang="en-US"/>
           </a:p>
@@ -7902,7 +8092,7 @@
 </p:sld>
 </file>
 
-<file path=ppt/slides/slide8.xml><?xml version="1.0" encoding="utf-8"?>
+<file path=ppt/slides/slide9.xml><?xml version="1.0" encoding="utf-8"?>
 <p:sld xmlns:a="http://schemas.openxmlformats.org/drawingml/2006/main" xmlns:r="http://schemas.openxmlformats.org/officeDocument/2006/relationships" xmlns:p="http://schemas.openxmlformats.org/presentationml/2006/main">
   <p:cSld>
     <p:spTree>
@@ -7942,7 +8132,7 @@
           <a:p>
             <a:fld id="{6700A58B-DD98-43D0-B791-721480A02982}" type="datetime1">
               <a:rPr lang="en-US" smtClean="0"/>
-              <a:t>12/30/20</a:t>
+              <a:t>1/10/21</a:t>
             </a:fld>
             <a:endParaRPr lang="en-US"/>
           </a:p>
@@ -7999,7 +8189,7 @@
           <a:p>
             <a:fld id="{37290FF7-652B-4475-AEAB-8B1A5D23AE09}" type="slidenum">
               <a:rPr lang="en-US" smtClean="0"/>
-              <a:t>8</a:t>
+              <a:t>9</a:t>
             </a:fld>
             <a:endParaRPr lang="en-US"/>
           </a:p>
@@ -8140,55 +8330,6 @@
             <a:r>
               <a:rPr lang="en-US" dirty="0"/>
               <a:t>Case II: E-Sports Exploration</a:t>
-            </a:r>
-          </a:p>
-        </p:txBody>
-      </p:sp>
-      <p:sp>
-        <p:nvSpPr>
-          <p:cNvPr id="8" name="Rectangle 7">
-            <a:extLst>
-              <a:ext uri="{FF2B5EF4-FFF2-40B4-BE49-F238E27FC236}">
-                <a16:creationId xmlns:a16="http://schemas.microsoft.com/office/drawing/2014/main" id="{E33CA0DE-94F7-1049-8D6C-4C11CA4622C2}"/>
-              </a:ext>
-            </a:extLst>
-          </p:cNvPr>
-          <p:cNvSpPr/>
-          <p:nvPr/>
-        </p:nvSpPr>
-        <p:spPr>
-          <a:xfrm>
-            <a:off x="533400" y="6008461"/>
-            <a:ext cx="7870371" cy="365125"/>
-          </a:xfrm>
-          <a:prstGeom prst="rect">
-            <a:avLst/>
-          </a:prstGeom>
-        </p:spPr>
-        <p:style>
-          <a:lnRef idx="2">
-            <a:schemeClr val="accent1">
-              <a:shade val="50000"/>
-            </a:schemeClr>
-          </a:lnRef>
-          <a:fillRef idx="1">
-            <a:schemeClr val="accent1"/>
-          </a:fillRef>
-          <a:effectRef idx="0">
-            <a:schemeClr val="accent1"/>
-          </a:effectRef>
-          <a:fontRef idx="minor">
-            <a:schemeClr val="lt1"/>
-          </a:fontRef>
-        </p:style>
-        <p:txBody>
-          <a:bodyPr rtlCol="0" anchor="ctr"/>
-          <a:lstStyle/>
-          <a:p>
-            <a:pPr algn="ctr"/>
-            <a:r>
-              <a:rPr lang="en-US" dirty="0"/>
-              <a:t>Plan that your Jan 22-24 weekend is miserable…but you get 2 credits in 3 weeks!</a:t>
             </a:r>
           </a:p>
         </p:txBody>

</xml_diff>

<commit_message>
update typos in pptx1/2
</commit_message>
<xml_diff>
--- a/lessons/class1/Class1A_Intros.pptx
+++ b/lessons/class1/Class1A_Intros.pptx
@@ -222,7 +222,7 @@
           <a:p>
             <a:fld id="{B0C0A60C-850A-4EA4-9C14-A8FE98B94505}" type="datetimeFigureOut">
               <a:rPr lang="en-US" smtClean="0"/>
-              <a:t>1/10/21</a:t>
+              <a:t>1/11/21</a:t>
             </a:fld>
             <a:endParaRPr lang="en-US"/>
           </a:p>
@@ -621,7 +621,7 @@
           <a:p>
             <a:fld id="{5738B90E-0779-4C36-915C-6F05FCD89456}" type="datetime1">
               <a:rPr lang="en-US" smtClean="0"/>
-              <a:t>1/10/21</a:t>
+              <a:t>1/11/21</a:t>
             </a:fld>
             <a:endParaRPr lang="en-US"/>
           </a:p>
@@ -801,7 +801,7 @@
           <a:p>
             <a:fld id="{7B9EA29D-D431-42FE-B7B6-AAE4454C77D3}" type="datetime1">
               <a:rPr lang="en-US" smtClean="0"/>
-              <a:t>1/10/21</a:t>
+              <a:t>1/11/21</a:t>
             </a:fld>
             <a:endParaRPr lang="en-US"/>
           </a:p>
@@ -1058,7 +1058,7 @@
           <a:p>
             <a:fld id="{690D8A1E-EA8F-46C1-B891-AE0C00D9C314}" type="datetime1">
               <a:rPr lang="en-US" smtClean="0"/>
-              <a:t>1/10/21</a:t>
+              <a:t>1/11/21</a:t>
             </a:fld>
             <a:endParaRPr lang="en-US"/>
           </a:p>
@@ -1349,7 +1349,7 @@
           <a:p>
             <a:fld id="{D753EFC8-4232-4598-94F6-94C0EBAFC469}" type="datetime1">
               <a:rPr lang="en-US" smtClean="0"/>
-              <a:t>1/10/21</a:t>
+              <a:t>1/11/21</a:t>
             </a:fld>
             <a:endParaRPr lang="en-US"/>
           </a:p>
@@ -1661,7 +1661,7 @@
           <a:p>
             <a:fld id="{F3161074-1C18-4AE7-957D-F18524378C85}" type="datetime1">
               <a:rPr lang="en-US" smtClean="0"/>
-              <a:t>1/10/21</a:t>
+              <a:t>1/11/21</a:t>
             </a:fld>
             <a:endParaRPr lang="en-US"/>
           </a:p>
@@ -1897,7 +1897,7 @@
           <a:p>
             <a:fld id="{69BE256C-8D9A-4404-B47D-41A1AE514425}" type="datetime1">
               <a:rPr lang="en-US" smtClean="0"/>
-              <a:t>1/10/21</a:t>
+              <a:t>1/11/21</a:t>
             </a:fld>
             <a:endParaRPr lang="en-US"/>
           </a:p>
@@ -2328,7 +2328,7 @@
           <a:p>
             <a:fld id="{66CB2154-9035-4012-8189-BAAB61C5A5EE}" type="datetime1">
               <a:rPr lang="en-US" smtClean="0"/>
-              <a:t>1/10/21</a:t>
+              <a:t>1/11/21</a:t>
             </a:fld>
             <a:endParaRPr lang="en-US"/>
           </a:p>
@@ -2499,7 +2499,7 @@
           <a:p>
             <a:fld id="{6700A58B-DD98-43D0-B791-721480A02982}" type="datetime1">
               <a:rPr lang="en-US" smtClean="0"/>
-              <a:t>1/10/21</a:t>
+              <a:t>1/11/21</a:t>
             </a:fld>
             <a:endParaRPr lang="en-US"/>
           </a:p>
@@ -2688,7 +2688,7 @@
           <a:p>
             <a:fld id="{7DB6E382-4F61-4E24-BE1A-377EC83D0E3A}" type="datetime1">
               <a:rPr lang="en-US" smtClean="0"/>
-              <a:t>1/10/21</a:t>
+              <a:t>1/11/21</a:t>
             </a:fld>
             <a:endParaRPr lang="en-US"/>
           </a:p>
@@ -2996,7 +2996,7 @@
           <a:p>
             <a:fld id="{4142EED6-FC16-45B9-B8C4-2BC5DBA88325}" type="datetime1">
               <a:rPr lang="en-US" smtClean="0"/>
-              <a:t>1/10/21</a:t>
+              <a:t>1/11/21</a:t>
             </a:fld>
             <a:endParaRPr lang="en-US"/>
           </a:p>
@@ -3311,7 +3311,7 @@
           <a:p>
             <a:fld id="{DF59512B-4F1D-43D7-8819-2F53FEF69650}" type="datetime1">
               <a:rPr lang="en-US" smtClean="0"/>
-              <a:t>1/10/21</a:t>
+              <a:t>1/11/21</a:t>
             </a:fld>
             <a:endParaRPr lang="en-US"/>
           </a:p>
@@ -3584,7 +3584,7 @@
           <a:p>
             <a:fld id="{08437B94-E2BF-44DC-ADC5-B05FC9934E9D}" type="datetime1">
               <a:rPr lang="en-US" smtClean="0"/>
-              <a:t>1/10/21</a:t>
+              <a:t>1/11/21</a:t>
             </a:fld>
             <a:endParaRPr lang="en-US"/>
           </a:p>
@@ -4017,7 +4017,7 @@
           <a:p>
             <a:r>
               <a:rPr lang="en-US" dirty="0"/>
-              <a:t>GSERM: Text Mining &amp; NLP</a:t>
+              <a:t>Text Mining &amp; NLP</a:t>
             </a:r>
             <a:br>
               <a:rPr lang="en-US" dirty="0"/>
@@ -4068,7 +4068,7 @@
           <a:p>
             <a:fld id="{5738B90E-0779-4C36-915C-6F05FCD89456}" type="datetime1">
               <a:rPr lang="en-US" smtClean="0"/>
-              <a:t>1/10/21</a:t>
+              <a:t>1/11/21</a:t>
             </a:fld>
             <a:endParaRPr lang="en-US"/>
           </a:p>
@@ -4283,7 +4283,7 @@
           <a:p>
             <a:fld id="{D753EFC8-4232-4598-94F6-94C0EBAFC469}" type="datetime1">
               <a:rPr lang="en-US" smtClean="0"/>
-              <a:t>1/10/21</a:t>
+              <a:t>1/11/21</a:t>
             </a:fld>
             <a:endParaRPr lang="en-US"/>
           </a:p>
@@ -4447,7 +4447,7 @@
           <a:p>
             <a:fld id="{7DB6E382-4F61-4E24-BE1A-377EC83D0E3A}" type="datetime1">
               <a:rPr lang="en-US" smtClean="0"/>
-              <a:t>1/10/21</a:t>
+              <a:t>1/11/21</a:t>
             </a:fld>
             <a:endParaRPr lang="en-US"/>
           </a:p>
@@ -5432,7 +5432,7 @@
           <a:p>
             <a:fld id="{6700A58B-DD98-43D0-B791-721480A02982}" type="datetime1">
               <a:rPr lang="en-US" smtClean="0"/>
-              <a:t>1/10/21</a:t>
+              <a:t>1/11/21</a:t>
             </a:fld>
             <a:endParaRPr lang="en-US"/>
           </a:p>
@@ -5721,7 +5721,7 @@
           <a:p>
             <a:fld id="{6700A58B-DD98-43D0-B791-721480A02982}" type="datetime1">
               <a:rPr lang="en-US" smtClean="0"/>
-              <a:t>1/10/21</a:t>
+              <a:t>1/11/21</a:t>
             </a:fld>
             <a:endParaRPr lang="en-US"/>
           </a:p>
@@ -5896,7 +5896,7 @@
         <p:spPr>
           <a:xfrm>
             <a:off x="208643" y="1093928"/>
-            <a:ext cx="8726714" cy="523220"/>
+            <a:ext cx="8726714" cy="307777"/>
           </a:xfrm>
           <a:prstGeom prst="rect">
             <a:avLst/>
@@ -5912,11 +5912,8 @@
               <a:rPr lang="en-US" sz="1400" dirty="0">
                 <a:hlinkClick r:id="rId2"/>
               </a:rPr>
-              <a:t>https://github.com/kwartler/GSERM_Text_Remote_student/blob/master/GSERM_NLP_syllabus_remote.docx</a:t>
-            </a:r>
-            <a:endParaRPr lang="en-US" sz="1400" dirty="0"/>
-          </a:p>
-          <a:p>
+              <a:t>https://github.com/kwartler/hult_NLP_student</a:t>
+            </a:r>
             <a:endParaRPr lang="en-US" sz="1400" dirty="0"/>
           </a:p>
         </p:txBody>
@@ -6623,7 +6620,7 @@
           <a:p>
             <a:fld id="{6700A58B-DD98-43D0-B791-721480A02982}" type="datetime1">
               <a:rPr lang="en-US" smtClean="0"/>
-              <a:t>1/10/21</a:t>
+              <a:t>1/11/21</a:t>
             </a:fld>
             <a:endParaRPr lang="en-US"/>
           </a:p>
@@ -7096,7 +7093,7 @@
           <a:p>
             <a:fld id="{6700A58B-DD98-43D0-B791-721480A02982}" type="datetime1">
               <a:rPr lang="en-US" smtClean="0"/>
-              <a:t>1/10/21</a:t>
+              <a:t>1/11/21</a:t>
             </a:fld>
             <a:endParaRPr lang="en-US" dirty="0"/>
           </a:p>
@@ -7723,7 +7720,7 @@
           <a:p>
             <a:fld id="{6700A58B-DD98-43D0-B791-721480A02982}" type="datetime1">
               <a:rPr lang="en-US" smtClean="0"/>
-              <a:t>1/10/21</a:t>
+              <a:t>1/11/21</a:t>
             </a:fld>
             <a:endParaRPr lang="en-US"/>
           </a:p>
@@ -8132,7 +8129,7 @@
           <a:p>
             <a:fld id="{6700A58B-DD98-43D0-B791-721480A02982}" type="datetime1">
               <a:rPr lang="en-US" smtClean="0"/>
-              <a:t>1/10/21</a:t>
+              <a:t>1/11/21</a:t>
             </a:fld>
             <a:endParaRPr lang="en-US"/>
           </a:p>

</xml_diff>

<commit_message>
adjust dates on slide
</commit_message>
<xml_diff>
--- a/lessons/class1/Class1A_Intros.pptx
+++ b/lessons/class1/Class1A_Intros.pptx
@@ -5,18 +5,17 @@
     <p:sldMasterId id="2147483660" r:id="rId1"/>
   </p:sldMasterIdLst>
   <p:notesMasterIdLst>
-    <p:notesMasterId r:id="rId11"/>
+    <p:notesMasterId r:id="rId10"/>
   </p:notesMasterIdLst>
   <p:sldIdLst>
     <p:sldId id="593" r:id="rId2"/>
     <p:sldId id="754" r:id="rId3"/>
     <p:sldId id="752" r:id="rId4"/>
-    <p:sldId id="740" r:id="rId5"/>
-    <p:sldId id="632" r:id="rId6"/>
-    <p:sldId id="741" r:id="rId7"/>
-    <p:sldId id="742" r:id="rId8"/>
-    <p:sldId id="743" r:id="rId9"/>
-    <p:sldId id="753" r:id="rId10"/>
+    <p:sldId id="632" r:id="rId5"/>
+    <p:sldId id="741" r:id="rId6"/>
+    <p:sldId id="742" r:id="rId7"/>
+    <p:sldId id="743" r:id="rId8"/>
+    <p:sldId id="753" r:id="rId9"/>
   </p:sldIdLst>
   <p:sldSz cx="9144000" cy="6858000" type="screen4x3"/>
   <p:notesSz cx="6858000" cy="9144000"/>
@@ -222,7 +221,7 @@
           <a:p>
             <a:fld id="{B0C0A60C-850A-4EA4-9C14-A8FE98B94505}" type="datetimeFigureOut">
               <a:rPr lang="en-US" smtClean="0"/>
-              <a:t>1/11/21</a:t>
+              <a:t>2/22/21</a:t>
             </a:fld>
             <a:endParaRPr lang="en-US"/>
           </a:p>
@@ -621,7 +620,7 @@
           <a:p>
             <a:fld id="{5738B90E-0779-4C36-915C-6F05FCD89456}" type="datetime1">
               <a:rPr lang="en-US" smtClean="0"/>
-              <a:t>1/11/21</a:t>
+              <a:t>2/22/21</a:t>
             </a:fld>
             <a:endParaRPr lang="en-US"/>
           </a:p>
@@ -801,7 +800,7 @@
           <a:p>
             <a:fld id="{7B9EA29D-D431-42FE-B7B6-AAE4454C77D3}" type="datetime1">
               <a:rPr lang="en-US" smtClean="0"/>
-              <a:t>1/11/21</a:t>
+              <a:t>2/22/21</a:t>
             </a:fld>
             <a:endParaRPr lang="en-US"/>
           </a:p>
@@ -1058,7 +1057,7 @@
           <a:p>
             <a:fld id="{690D8A1E-EA8F-46C1-B891-AE0C00D9C314}" type="datetime1">
               <a:rPr lang="en-US" smtClean="0"/>
-              <a:t>1/11/21</a:t>
+              <a:t>2/22/21</a:t>
             </a:fld>
             <a:endParaRPr lang="en-US"/>
           </a:p>
@@ -1349,7 +1348,7 @@
           <a:p>
             <a:fld id="{D753EFC8-4232-4598-94F6-94C0EBAFC469}" type="datetime1">
               <a:rPr lang="en-US" smtClean="0"/>
-              <a:t>1/11/21</a:t>
+              <a:t>2/22/21</a:t>
             </a:fld>
             <a:endParaRPr lang="en-US"/>
           </a:p>
@@ -1661,7 +1660,7 @@
           <a:p>
             <a:fld id="{F3161074-1C18-4AE7-957D-F18524378C85}" type="datetime1">
               <a:rPr lang="en-US" smtClean="0"/>
-              <a:t>1/11/21</a:t>
+              <a:t>2/22/21</a:t>
             </a:fld>
             <a:endParaRPr lang="en-US"/>
           </a:p>
@@ -1897,7 +1896,7 @@
           <a:p>
             <a:fld id="{69BE256C-8D9A-4404-B47D-41A1AE514425}" type="datetime1">
               <a:rPr lang="en-US" smtClean="0"/>
-              <a:t>1/11/21</a:t>
+              <a:t>2/22/21</a:t>
             </a:fld>
             <a:endParaRPr lang="en-US"/>
           </a:p>
@@ -2328,7 +2327,7 @@
           <a:p>
             <a:fld id="{66CB2154-9035-4012-8189-BAAB61C5A5EE}" type="datetime1">
               <a:rPr lang="en-US" smtClean="0"/>
-              <a:t>1/11/21</a:t>
+              <a:t>2/22/21</a:t>
             </a:fld>
             <a:endParaRPr lang="en-US"/>
           </a:p>
@@ -2499,7 +2498,7 @@
           <a:p>
             <a:fld id="{6700A58B-DD98-43D0-B791-721480A02982}" type="datetime1">
               <a:rPr lang="en-US" smtClean="0"/>
-              <a:t>1/11/21</a:t>
+              <a:t>2/22/21</a:t>
             </a:fld>
             <a:endParaRPr lang="en-US"/>
           </a:p>
@@ -2688,7 +2687,7 @@
           <a:p>
             <a:fld id="{7DB6E382-4F61-4E24-BE1A-377EC83D0E3A}" type="datetime1">
               <a:rPr lang="en-US" smtClean="0"/>
-              <a:t>1/11/21</a:t>
+              <a:t>2/22/21</a:t>
             </a:fld>
             <a:endParaRPr lang="en-US"/>
           </a:p>
@@ -2996,7 +2995,7 @@
           <a:p>
             <a:fld id="{4142EED6-FC16-45B9-B8C4-2BC5DBA88325}" type="datetime1">
               <a:rPr lang="en-US" smtClean="0"/>
-              <a:t>1/11/21</a:t>
+              <a:t>2/22/21</a:t>
             </a:fld>
             <a:endParaRPr lang="en-US"/>
           </a:p>
@@ -3311,7 +3310,7 @@
           <a:p>
             <a:fld id="{DF59512B-4F1D-43D7-8819-2F53FEF69650}" type="datetime1">
               <a:rPr lang="en-US" smtClean="0"/>
-              <a:t>1/11/21</a:t>
+              <a:t>2/22/21</a:t>
             </a:fld>
             <a:endParaRPr lang="en-US"/>
           </a:p>
@@ -3584,7 +3583,7 @@
           <a:p>
             <a:fld id="{08437B94-E2BF-44DC-ADC5-B05FC9934E9D}" type="datetime1">
               <a:rPr lang="en-US" smtClean="0"/>
-              <a:t>1/11/21</a:t>
+              <a:t>2/22/21</a:t>
             </a:fld>
             <a:endParaRPr lang="en-US"/>
           </a:p>
@@ -4068,7 +4067,7 @@
           <a:p>
             <a:fld id="{5738B90E-0779-4C36-915C-6F05FCD89456}" type="datetime1">
               <a:rPr lang="en-US" smtClean="0"/>
-              <a:t>1/11/21</a:t>
+              <a:t>2/22/21</a:t>
             </a:fld>
             <a:endParaRPr lang="en-US"/>
           </a:p>
@@ -4283,7 +4282,7 @@
           <a:p>
             <a:fld id="{D753EFC8-4232-4598-94F6-94C0EBAFC469}" type="datetime1">
               <a:rPr lang="en-US" smtClean="0"/>
-              <a:t>1/11/21</a:t>
+              <a:t>2/22/21</a:t>
             </a:fld>
             <a:endParaRPr lang="en-US"/>
           </a:p>
@@ -4447,7 +4446,7 @@
           <a:p>
             <a:fld id="{7DB6E382-4F61-4E24-BE1A-377EC83D0E3A}" type="datetime1">
               <a:rPr lang="en-US" smtClean="0"/>
-              <a:t>1/11/21</a:t>
+              <a:t>2/22/21</a:t>
             </a:fld>
             <a:endParaRPr lang="en-US"/>
           </a:p>
@@ -5411,13 +5410,7 @@
       </p:grpSpPr>
       <p:sp>
         <p:nvSpPr>
-          <p:cNvPr id="2" name="Date Placeholder 1">
-            <a:extLst>
-              <a:ext uri="{FF2B5EF4-FFF2-40B4-BE49-F238E27FC236}">
-                <a16:creationId xmlns:a16="http://schemas.microsoft.com/office/drawing/2014/main" id="{67F51139-A6BB-7441-A87E-0972800B83C2}"/>
-              </a:ext>
-            </a:extLst>
-          </p:cNvPr>
+          <p:cNvPr id="2" name="Date Placeholder 1"/>
           <p:cNvSpPr>
             <a:spLocks noGrp="1"/>
           </p:cNvSpPr>
@@ -5432,7 +5425,7 @@
           <a:p>
             <a:fld id="{6700A58B-DD98-43D0-B791-721480A02982}" type="datetime1">
               <a:rPr lang="en-US" smtClean="0"/>
-              <a:t>1/11/21</a:t>
+              <a:t>2/22/21</a:t>
             </a:fld>
             <a:endParaRPr lang="en-US"/>
           </a:p>
@@ -5440,13 +5433,7 @@
       </p:sp>
       <p:sp>
         <p:nvSpPr>
-          <p:cNvPr id="3" name="Title 2">
-            <a:extLst>
-              <a:ext uri="{FF2B5EF4-FFF2-40B4-BE49-F238E27FC236}">
-                <a16:creationId xmlns:a16="http://schemas.microsoft.com/office/drawing/2014/main" id="{348E7CEB-D988-9F4C-AD97-63C5B5BBE183}"/>
-              </a:ext>
-            </a:extLst>
-          </p:cNvPr>
+          <p:cNvPr id="3" name="Title 2"/>
           <p:cNvSpPr>
             <a:spLocks noGrp="1"/>
           </p:cNvSpPr>
@@ -5454,32 +5441,21 @@
             <p:ph type="title"/>
           </p:nvPr>
         </p:nvSpPr>
-        <p:spPr>
-          <a:xfrm>
-            <a:off x="134470" y="378573"/>
-            <a:ext cx="8515350" cy="591477"/>
-          </a:xfrm>
-        </p:spPr>
+        <p:spPr/>
         <p:txBody>
           <a:bodyPr/>
           <a:lstStyle/>
           <a:p>
             <a:r>
               <a:rPr lang="en-US" dirty="0"/>
-              <a:t>Introductions…post online for your Teaching Staff</a:t>
-            </a:r>
-          </a:p>
-        </p:txBody>
-      </p:sp>
-      <p:sp>
-        <p:nvSpPr>
-          <p:cNvPr id="4" name="Slide Number Placeholder 3">
-            <a:extLst>
-              <a:ext uri="{FF2B5EF4-FFF2-40B4-BE49-F238E27FC236}">
-                <a16:creationId xmlns:a16="http://schemas.microsoft.com/office/drawing/2014/main" id="{A4B822B3-21DC-C344-82E3-B52E3884841A}"/>
-              </a:ext>
-            </a:extLst>
-          </p:cNvPr>
+              <a:t>Syllabus Review</a:t>
+            </a:r>
+          </a:p>
+        </p:txBody>
+      </p:sp>
+      <p:sp>
+        <p:nvSpPr>
+          <p:cNvPr id="4" name="Slide Number Placeholder 3"/>
           <p:cNvSpPr>
             <a:spLocks noGrp="1"/>
           </p:cNvSpPr>
@@ -5495,278 +5471,6 @@
             <a:fld id="{37290FF7-652B-4475-AEAB-8B1A5D23AE09}" type="slidenum">
               <a:rPr lang="en-US" smtClean="0"/>
               <a:t>4</a:t>
-            </a:fld>
-            <a:endParaRPr lang="en-US"/>
-          </a:p>
-        </p:txBody>
-      </p:sp>
-      <p:sp>
-        <p:nvSpPr>
-          <p:cNvPr id="5" name="Footer Placeholder 4">
-            <a:extLst>
-              <a:ext uri="{FF2B5EF4-FFF2-40B4-BE49-F238E27FC236}">
-                <a16:creationId xmlns:a16="http://schemas.microsoft.com/office/drawing/2014/main" id="{3F271DBD-90CD-D347-B580-C0741CCAF08D}"/>
-              </a:ext>
-            </a:extLst>
-          </p:cNvPr>
-          <p:cNvSpPr>
-            <a:spLocks noGrp="1"/>
-          </p:cNvSpPr>
-          <p:nvPr>
-            <p:ph type="ftr" sz="quarter" idx="3"/>
-          </p:nvPr>
-        </p:nvSpPr>
-        <p:spPr/>
-        <p:txBody>
-          <a:bodyPr/>
-          <a:lstStyle/>
-          <a:p>
-            <a:r>
-              <a:rPr lang="en-US"/>
-              <a:t>Kwartler</a:t>
-            </a:r>
-            <a:endParaRPr lang="en-US" dirty="0"/>
-          </a:p>
-        </p:txBody>
-      </p:sp>
-      <p:sp>
-        <p:nvSpPr>
-          <p:cNvPr id="6" name="TextBox 5">
-            <a:extLst>
-              <a:ext uri="{FF2B5EF4-FFF2-40B4-BE49-F238E27FC236}">
-                <a16:creationId xmlns:a16="http://schemas.microsoft.com/office/drawing/2014/main" id="{381A3DCA-2F1C-834F-9075-976A8E3093CD}"/>
-              </a:ext>
-            </a:extLst>
-          </p:cNvPr>
-          <p:cNvSpPr txBox="1"/>
-          <p:nvPr/>
-        </p:nvSpPr>
-        <p:spPr>
-          <a:xfrm>
-            <a:off x="874059" y="1828800"/>
-            <a:ext cx="5904950" cy="2246769"/>
-          </a:xfrm>
-          <a:prstGeom prst="rect">
-            <a:avLst/>
-          </a:prstGeom>
-          <a:noFill/>
-        </p:spPr>
-        <p:txBody>
-          <a:bodyPr wrap="none" rtlCol="0">
-            <a:spAutoFit/>
-          </a:bodyPr>
-          <a:lstStyle/>
-          <a:p>
-            <a:r>
-              <a:rPr lang="en-US" sz="2800" dirty="0"/>
-              <a:t>Name</a:t>
-            </a:r>
-          </a:p>
-          <a:p>
-            <a:r>
-              <a:rPr lang="en-US" sz="2800" dirty="0"/>
-              <a:t>Location</a:t>
-            </a:r>
-          </a:p>
-          <a:p>
-            <a:r>
-              <a:rPr lang="en-US" sz="2800" dirty="0"/>
-              <a:t>Background </a:t>
-            </a:r>
-          </a:p>
-          <a:p>
-            <a:r>
-              <a:rPr lang="en-US" sz="2800" dirty="0"/>
-              <a:t>Why are you taking this course?</a:t>
-            </a:r>
-          </a:p>
-          <a:p>
-            <a:r>
-              <a:rPr lang="en-US" sz="2800" dirty="0"/>
-              <a:t>Are you working on VM, local or cloud?</a:t>
-            </a:r>
-          </a:p>
-        </p:txBody>
-      </p:sp>
-      <p:cxnSp>
-        <p:nvCxnSpPr>
-          <p:cNvPr id="7" name="Straight Connector 6">
-            <a:extLst>
-              <a:ext uri="{FF2B5EF4-FFF2-40B4-BE49-F238E27FC236}">
-                <a16:creationId xmlns:a16="http://schemas.microsoft.com/office/drawing/2014/main" id="{A09F65CB-83A3-5843-A416-106A54D59C68}"/>
-              </a:ext>
-            </a:extLst>
-          </p:cNvPr>
-          <p:cNvCxnSpPr/>
-          <p:nvPr/>
-        </p:nvCxnSpPr>
-        <p:spPr>
-          <a:xfrm>
-            <a:off x="6798363" y="6549885"/>
-            <a:ext cx="0" cy="182880"/>
-          </a:xfrm>
-          <a:prstGeom prst="line">
-            <a:avLst/>
-          </a:prstGeom>
-          <a:ln>
-            <a:solidFill>
-              <a:schemeClr val="bg1">
-                <a:lumMod val="85000"/>
-              </a:schemeClr>
-            </a:solidFill>
-          </a:ln>
-        </p:spPr>
-        <p:style>
-          <a:lnRef idx="1">
-            <a:schemeClr val="accent1"/>
-          </a:lnRef>
-          <a:fillRef idx="0">
-            <a:schemeClr val="accent1"/>
-          </a:fillRef>
-          <a:effectRef idx="0">
-            <a:schemeClr val="accent1"/>
-          </a:effectRef>
-          <a:fontRef idx="minor">
-            <a:schemeClr val="tx1"/>
-          </a:fontRef>
-        </p:style>
-      </p:cxnSp>
-      <p:cxnSp>
-        <p:nvCxnSpPr>
-          <p:cNvPr id="8" name="Straight Connector 7">
-            <a:extLst>
-              <a:ext uri="{FF2B5EF4-FFF2-40B4-BE49-F238E27FC236}">
-                <a16:creationId xmlns:a16="http://schemas.microsoft.com/office/drawing/2014/main" id="{8928AF32-EB77-1144-9EF8-BFAB62D5C653}"/>
-              </a:ext>
-            </a:extLst>
-          </p:cNvPr>
-          <p:cNvCxnSpPr/>
-          <p:nvPr/>
-        </p:nvCxnSpPr>
-        <p:spPr>
-          <a:xfrm>
-            <a:off x="7076661" y="4664763"/>
-            <a:ext cx="182880" cy="0"/>
-          </a:xfrm>
-          <a:prstGeom prst="line">
-            <a:avLst/>
-          </a:prstGeom>
-          <a:ln>
-            <a:solidFill>
-              <a:schemeClr val="bg1">
-                <a:lumMod val="85000"/>
-              </a:schemeClr>
-            </a:solidFill>
-          </a:ln>
-        </p:spPr>
-        <p:style>
-          <a:lnRef idx="1">
-            <a:schemeClr val="accent1"/>
-          </a:lnRef>
-          <a:fillRef idx="0">
-            <a:schemeClr val="accent1"/>
-          </a:fillRef>
-          <a:effectRef idx="0">
-            <a:schemeClr val="accent1"/>
-          </a:effectRef>
-          <a:fontRef idx="minor">
-            <a:schemeClr val="tx1"/>
-          </a:fontRef>
-        </p:style>
-      </p:cxnSp>
-    </p:spTree>
-    <p:extLst>
-      <p:ext uri="{BB962C8B-B14F-4D97-AF65-F5344CB8AC3E}">
-        <p14:creationId xmlns:p14="http://schemas.microsoft.com/office/powerpoint/2010/main" val="1709732844"/>
-      </p:ext>
-    </p:extLst>
-  </p:cSld>
-  <p:clrMapOvr>
-    <a:masterClrMapping/>
-  </p:clrMapOvr>
-</p:sld>
-</file>
-
-<file path=ppt/slides/slide5.xml><?xml version="1.0" encoding="utf-8"?>
-<p:sld xmlns:a="http://schemas.openxmlformats.org/drawingml/2006/main" xmlns:r="http://schemas.openxmlformats.org/officeDocument/2006/relationships" xmlns:p="http://schemas.openxmlformats.org/presentationml/2006/main">
-  <p:cSld>
-    <p:spTree>
-      <p:nvGrpSpPr>
-        <p:cNvPr id="1" name=""/>
-        <p:cNvGrpSpPr/>
-        <p:nvPr/>
-      </p:nvGrpSpPr>
-      <p:grpSpPr>
-        <a:xfrm>
-          <a:off x="0" y="0"/>
-          <a:ext cx="0" cy="0"/>
-          <a:chOff x="0" y="0"/>
-          <a:chExt cx="0" cy="0"/>
-        </a:xfrm>
-      </p:grpSpPr>
-      <p:sp>
-        <p:nvSpPr>
-          <p:cNvPr id="2" name="Date Placeholder 1"/>
-          <p:cNvSpPr>
-            <a:spLocks noGrp="1"/>
-          </p:cNvSpPr>
-          <p:nvPr>
-            <p:ph type="dt" sz="half" idx="10"/>
-          </p:nvPr>
-        </p:nvSpPr>
-        <p:spPr/>
-        <p:txBody>
-          <a:bodyPr/>
-          <a:lstStyle/>
-          <a:p>
-            <a:fld id="{6700A58B-DD98-43D0-B791-721480A02982}" type="datetime1">
-              <a:rPr lang="en-US" smtClean="0"/>
-              <a:t>1/11/21</a:t>
-            </a:fld>
-            <a:endParaRPr lang="en-US"/>
-          </a:p>
-        </p:txBody>
-      </p:sp>
-      <p:sp>
-        <p:nvSpPr>
-          <p:cNvPr id="3" name="Title 2"/>
-          <p:cNvSpPr>
-            <a:spLocks noGrp="1"/>
-          </p:cNvSpPr>
-          <p:nvPr>
-            <p:ph type="title"/>
-          </p:nvPr>
-        </p:nvSpPr>
-        <p:spPr/>
-        <p:txBody>
-          <a:bodyPr/>
-          <a:lstStyle/>
-          <a:p>
-            <a:r>
-              <a:rPr lang="en-US" dirty="0"/>
-              <a:t>Syllabus Review</a:t>
-            </a:r>
-          </a:p>
-        </p:txBody>
-      </p:sp>
-      <p:sp>
-        <p:nvSpPr>
-          <p:cNvPr id="4" name="Slide Number Placeholder 3"/>
-          <p:cNvSpPr>
-            <a:spLocks noGrp="1"/>
-          </p:cNvSpPr>
-          <p:nvPr>
-            <p:ph type="sldNum" sz="quarter" idx="12"/>
-          </p:nvPr>
-        </p:nvSpPr>
-        <p:spPr/>
-        <p:txBody>
-          <a:bodyPr/>
-          <a:lstStyle/>
-          <a:p>
-            <a:fld id="{37290FF7-652B-4475-AEAB-8B1A5D23AE09}" type="slidenum">
-              <a:rPr lang="en-US" smtClean="0"/>
-              <a:t>5</a:t>
             </a:fld>
             <a:endParaRPr lang="en-US"/>
           </a:p>
@@ -5933,14 +5637,14 @@
           <p:nvPr>
             <p:extLst>
               <p:ext uri="{D42A27DB-BD31-4B8C-83A1-F6EECF244321}">
-                <p14:modId xmlns:p14="http://schemas.microsoft.com/office/powerpoint/2010/main" val="2157731338"/>
+                <p14:modId xmlns:p14="http://schemas.microsoft.com/office/powerpoint/2010/main" val="1411231842"/>
               </p:ext>
             </p:extLst>
           </p:nvPr>
         </p:nvGraphicFramePr>
         <p:xfrm>
           <a:off x="361950" y="1617148"/>
-          <a:ext cx="6096000" cy="3556000"/>
+          <a:ext cx="6096000" cy="3261360"/>
         </p:xfrm>
         <a:graphic>
           <a:graphicData uri="http://schemas.openxmlformats.org/drawingml/2006/table">
@@ -6083,7 +5787,7 @@
                         <a:rPr lang="en-US" sz="1400" b="0" dirty="0">
                           <a:latin typeface="+mn-lt"/>
                         </a:rPr>
-                        <a:t>Jan 12</a:t>
+                        <a:t>Feb 24</a:t>
                       </a:r>
                     </a:p>
                   </a:txBody>
@@ -6147,7 +5851,7 @@
                         <a:rPr lang="en-US" sz="1400" b="0" dirty="0">
                           <a:latin typeface="+mn-lt"/>
                         </a:rPr>
-                        <a:t>Jan 13</a:t>
+                        <a:t>Feb 25</a:t>
                       </a:r>
                     </a:p>
                   </a:txBody>
@@ -6195,7 +5899,7 @@
                           <a:ea typeface="Arial Unicode MS" panose="020B0604020202020204" pitchFamily="34" charset="-128"/>
                           <a:cs typeface="Arial Unicode MS" panose="020B0604020202020204" pitchFamily="34" charset="-128"/>
                         </a:rPr>
-                        <a:t>3. CASE I. NBA Fan Engagement </a:t>
+                        <a:t>3. CASE I. </a:t>
                       </a:r>
                     </a:p>
                   </a:txBody>
@@ -6214,7 +5918,7 @@
                           </a:solidFill>
                           <a:latin typeface="+mn-lt"/>
                         </a:rPr>
-                        <a:t>Jan 20</a:t>
+                        <a:t>Mar 1</a:t>
                       </a:r>
                     </a:p>
                   </a:txBody>
@@ -6258,7 +5962,7 @@
                           </a:solidFill>
                           <a:latin typeface="+mn-lt"/>
                         </a:rPr>
-                        <a:t>4.  Case II. E-Sports Marketing</a:t>
+                        <a:t>4.  Case II. </a:t>
                       </a:r>
                     </a:p>
                   </a:txBody>
@@ -6277,7 +5981,7 @@
                           </a:solidFill>
                           <a:latin typeface="+mn-lt"/>
                         </a:rPr>
-                        <a:t>Jan 25</a:t>
+                        <a:t>Mar 8</a:t>
                       </a:r>
                     </a:p>
                   </a:txBody>
@@ -6334,7 +6038,7 @@
                         <a:rPr lang="en-US" sz="1400" b="0" dirty="0">
                           <a:latin typeface="+mn-lt"/>
                         </a:rPr>
-                        <a:t>Jan 30</a:t>
+                        <a:t>Mar 12</a:t>
                       </a:r>
                     </a:p>
                     <a:p>
@@ -6413,7 +6117,7 @@
                         <a:rPr lang="en-US" sz="1400" b="0" dirty="0">
                           <a:latin typeface="+mn-lt"/>
                         </a:rPr>
-                        <a:t>Jan 30</a:t>
+                        <a:t>Mar 12</a:t>
                       </a:r>
                     </a:p>
                     <a:p>
@@ -6524,55 +6228,6 @@
           </a:graphicData>
         </a:graphic>
       </p:graphicFrame>
-      <p:sp>
-        <p:nvSpPr>
-          <p:cNvPr id="14" name="Rectangle 13">
-            <a:extLst>
-              <a:ext uri="{FF2B5EF4-FFF2-40B4-BE49-F238E27FC236}">
-                <a16:creationId xmlns:a16="http://schemas.microsoft.com/office/drawing/2014/main" id="{C4B42D96-86F6-244E-93A9-2B80127425B6}"/>
-              </a:ext>
-            </a:extLst>
-          </p:cNvPr>
-          <p:cNvSpPr/>
-          <p:nvPr/>
-        </p:nvSpPr>
-        <p:spPr>
-          <a:xfrm>
-            <a:off x="533400" y="5665561"/>
-            <a:ext cx="7870371" cy="365125"/>
-          </a:xfrm>
-          <a:prstGeom prst="rect">
-            <a:avLst/>
-          </a:prstGeom>
-        </p:spPr>
-        <p:style>
-          <a:lnRef idx="2">
-            <a:schemeClr val="accent1">
-              <a:shade val="50000"/>
-            </a:schemeClr>
-          </a:lnRef>
-          <a:fillRef idx="1">
-            <a:schemeClr val="accent1"/>
-          </a:fillRef>
-          <a:effectRef idx="0">
-            <a:schemeClr val="accent1"/>
-          </a:effectRef>
-          <a:fontRef idx="minor">
-            <a:schemeClr val="lt1"/>
-          </a:fontRef>
-        </p:style>
-        <p:txBody>
-          <a:bodyPr rtlCol="0" anchor="ctr"/>
-          <a:lstStyle/>
-          <a:p>
-            <a:pPr algn="ctr"/>
-            <a:r>
-              <a:rPr lang="en-US" dirty="0"/>
-              <a:t>Plan that your Jan 22-24 weekend is miserable…but you get 2 credits in 3 weeks!</a:t>
-            </a:r>
-          </a:p>
-        </p:txBody>
-      </p:sp>
     </p:spTree>
     <p:extLst>
       <p:ext uri="{BB962C8B-B14F-4D97-AF65-F5344CB8AC3E}">
@@ -6586,7 +6241,7 @@
 </p:sld>
 </file>
 
-<file path=ppt/slides/slide6.xml><?xml version="1.0" encoding="utf-8"?>
+<file path=ppt/slides/slide5.xml><?xml version="1.0" encoding="utf-8"?>
 <p:sld xmlns:a="http://schemas.openxmlformats.org/drawingml/2006/main" xmlns:r="http://schemas.openxmlformats.org/officeDocument/2006/relationships" xmlns:p="http://schemas.openxmlformats.org/presentationml/2006/main">
   <p:cSld>
     <p:spTree>
@@ -6620,7 +6275,7 @@
           <a:p>
             <a:fld id="{6700A58B-DD98-43D0-B791-721480A02982}" type="datetime1">
               <a:rPr lang="en-US" smtClean="0"/>
-              <a:t>1/11/21</a:t>
+              <a:t>2/22/21</a:t>
             </a:fld>
             <a:endParaRPr lang="en-US"/>
           </a:p>
@@ -6665,7 +6320,7 @@
           <a:p>
             <a:fld id="{37290FF7-652B-4475-AEAB-8B1A5D23AE09}" type="slidenum">
               <a:rPr lang="en-US" smtClean="0"/>
-              <a:t>6</a:t>
+              <a:t>5</a:t>
             </a:fld>
             <a:endParaRPr lang="en-US"/>
           </a:p>
@@ -7059,7 +6714,7 @@
 </p:sld>
 </file>
 
-<file path=ppt/slides/slide7.xml><?xml version="1.0" encoding="utf-8"?>
+<file path=ppt/slides/slide6.xml><?xml version="1.0" encoding="utf-8"?>
 <p:sld xmlns:a="http://schemas.openxmlformats.org/drawingml/2006/main" xmlns:r="http://schemas.openxmlformats.org/officeDocument/2006/relationships" xmlns:p="http://schemas.openxmlformats.org/presentationml/2006/main">
   <p:cSld>
     <p:spTree>
@@ -7093,7 +6748,7 @@
           <a:p>
             <a:fld id="{6700A58B-DD98-43D0-B791-721480A02982}" type="datetime1">
               <a:rPr lang="en-US" smtClean="0"/>
-              <a:t>1/11/21</a:t>
+              <a:t>2/22/21</a:t>
             </a:fld>
             <a:endParaRPr lang="en-US" dirty="0"/>
           </a:p>
@@ -7138,7 +6793,7 @@
           <a:p>
             <a:fld id="{37290FF7-652B-4475-AEAB-8B1A5D23AE09}" type="slidenum">
               <a:rPr lang="en-US" smtClean="0"/>
-              <a:t>7</a:t>
+              <a:t>6</a:t>
             </a:fld>
             <a:endParaRPr lang="en-US"/>
           </a:p>
@@ -7686,7 +7341,7 @@
 </p:sld>
 </file>
 
-<file path=ppt/slides/slide8.xml><?xml version="1.0" encoding="utf-8"?>
+<file path=ppt/slides/slide7.xml><?xml version="1.0" encoding="utf-8"?>
 <p:sld xmlns:a="http://schemas.openxmlformats.org/drawingml/2006/main" xmlns:r="http://schemas.openxmlformats.org/officeDocument/2006/relationships" xmlns:p="http://schemas.openxmlformats.org/presentationml/2006/main">
   <p:cSld>
     <p:spTree>
@@ -7720,7 +7375,7 @@
           <a:p>
             <a:fld id="{6700A58B-DD98-43D0-B791-721480A02982}" type="datetime1">
               <a:rPr lang="en-US" smtClean="0"/>
-              <a:t>1/11/21</a:t>
+              <a:t>2/22/21</a:t>
             </a:fld>
             <a:endParaRPr lang="en-US"/>
           </a:p>
@@ -7765,7 +7420,7 @@
           <a:p>
             <a:fld id="{37290FF7-652B-4475-AEAB-8B1A5D23AE09}" type="slidenum">
               <a:rPr lang="en-US" smtClean="0"/>
-              <a:t>8</a:t>
+              <a:t>7</a:t>
             </a:fld>
             <a:endParaRPr lang="en-US"/>
           </a:p>
@@ -8089,7 +7744,7 @@
 </p:sld>
 </file>
 
-<file path=ppt/slides/slide9.xml><?xml version="1.0" encoding="utf-8"?>
+<file path=ppt/slides/slide8.xml><?xml version="1.0" encoding="utf-8"?>
 <p:sld xmlns:a="http://schemas.openxmlformats.org/drawingml/2006/main" xmlns:r="http://schemas.openxmlformats.org/officeDocument/2006/relationships" xmlns:p="http://schemas.openxmlformats.org/presentationml/2006/main">
   <p:cSld>
     <p:spTree>
@@ -8129,7 +7784,7 @@
           <a:p>
             <a:fld id="{6700A58B-DD98-43D0-B791-721480A02982}" type="datetime1">
               <a:rPr lang="en-US" smtClean="0"/>
-              <a:t>1/11/21</a:t>
+              <a:t>2/22/21</a:t>
             </a:fld>
             <a:endParaRPr lang="en-US"/>
           </a:p>
@@ -8151,14 +7806,19 @@
             <p:ph type="title"/>
           </p:nvPr>
         </p:nvSpPr>
-        <p:spPr/>
+        <p:spPr>
+          <a:xfrm>
+            <a:off x="0" y="365126"/>
+            <a:ext cx="9144000" cy="591477"/>
+          </a:xfrm>
+        </p:spPr>
         <p:txBody>
           <a:bodyPr/>
           <a:lstStyle/>
           <a:p>
             <a:r>
               <a:rPr lang="en-US" dirty="0"/>
-              <a:t>Class Theme: Text Mining in Marketing</a:t>
+              <a:t>Class Theme: Text Mining in Marketing &amp; Investing</a:t>
             </a:r>
           </a:p>
         </p:txBody>
@@ -8186,7 +7846,7 @@
           <a:p>
             <a:fld id="{37290FF7-652B-4475-AEAB-8B1A5D23AE09}" type="slidenum">
               <a:rPr lang="en-US" smtClean="0"/>
-              <a:t>9</a:t>
+              <a:t>8</a:t>
             </a:fld>
             <a:endParaRPr lang="en-US"/>
           </a:p>
@@ -8271,7 +7931,15 @@
             <a:pPr algn="ctr"/>
             <a:r>
               <a:rPr lang="en-US" dirty="0"/>
-              <a:t>Case I: NBA Fan Engagement Over Time</a:t>
+              <a:t>Case I: </a:t>
+            </a:r>
+            <a:r>
+              <a:rPr lang="en-US" dirty="0" err="1"/>
+              <a:t>Hult</a:t>
+            </a:r>
+            <a:r>
+              <a:rPr lang="en-US" dirty="0"/>
+              <a:t> Student Ambassador</a:t>
             </a:r>
           </a:p>
         </p:txBody>
@@ -8326,151 +7994,81 @@
             <a:pPr algn="ctr"/>
             <a:r>
               <a:rPr lang="en-US" dirty="0"/>
-              <a:t>Case II: E-Sports Exploration</a:t>
-            </a:r>
-          </a:p>
-        </p:txBody>
-      </p:sp>
-      <p:pic>
-        <p:nvPicPr>
-          <p:cNvPr id="11" name="Picture 10">
+              <a:t>Case II: Wall Street Bets</a:t>
+            </a:r>
+          </a:p>
+        </p:txBody>
+      </p:sp>
+      <p:sp>
+        <p:nvSpPr>
+          <p:cNvPr id="8" name="TextBox 7">
             <a:extLst>
               <a:ext uri="{FF2B5EF4-FFF2-40B4-BE49-F238E27FC236}">
-                <a16:creationId xmlns:a16="http://schemas.microsoft.com/office/drawing/2014/main" id="{E90277C1-3582-A846-B4FF-71DDD24C5E84}"/>
+                <a16:creationId xmlns:a16="http://schemas.microsoft.com/office/drawing/2014/main" id="{50D25909-76DD-094A-AD80-6C3B9D73B5D3}"/>
               </a:ext>
             </a:extLst>
           </p:cNvPr>
-          <p:cNvPicPr>
-            <a:picLocks noChangeAspect="1"/>
-          </p:cNvPicPr>
+          <p:cNvSpPr txBox="1"/>
           <p:nvPr/>
-        </p:nvPicPr>
-        <p:blipFill>
-          <a:blip r:embed="rId2"/>
-          <a:stretch>
-            <a:fillRect/>
-          </a:stretch>
-        </p:blipFill>
-        <p:spPr>
-          <a:xfrm>
-            <a:off x="4546162" y="1690255"/>
-            <a:ext cx="3175000" cy="1778000"/>
+        </p:nvSpPr>
+        <p:spPr>
+          <a:xfrm>
+            <a:off x="266262" y="2967335"/>
+            <a:ext cx="4039038" cy="923330"/>
           </a:xfrm>
           <a:prstGeom prst="rect">
             <a:avLst/>
           </a:prstGeom>
-          <a:ln>
-            <a:solidFill>
-              <a:schemeClr val="tx2"/>
-            </a:solidFill>
-          </a:ln>
-        </p:spPr>
-      </p:pic>
-      <p:pic>
-        <p:nvPicPr>
-          <p:cNvPr id="12" name="Picture 11">
+          <a:noFill/>
+        </p:spPr>
+        <p:txBody>
+          <a:bodyPr wrap="square" rtlCol="0">
+            <a:spAutoFit/>
+          </a:bodyPr>
+          <a:lstStyle/>
+          <a:p>
+            <a:r>
+              <a:rPr lang="en-US" dirty="0"/>
+              <a:t>What major themes &amp; typical representations are showcased for the University to entice new students?</a:t>
+            </a:r>
+          </a:p>
+        </p:txBody>
+      </p:sp>
+      <p:sp>
+        <p:nvSpPr>
+          <p:cNvPr id="15" name="TextBox 14">
             <a:extLst>
               <a:ext uri="{FF2B5EF4-FFF2-40B4-BE49-F238E27FC236}">
-                <a16:creationId xmlns:a16="http://schemas.microsoft.com/office/drawing/2014/main" id="{5A8DB344-9C9A-B54B-A74D-40A3C17D243B}"/>
+                <a16:creationId xmlns:a16="http://schemas.microsoft.com/office/drawing/2014/main" id="{04159542-1EC5-134A-860E-CF4559AAA5C8}"/>
               </a:ext>
             </a:extLst>
           </p:cNvPr>
-          <p:cNvPicPr>
-            <a:picLocks noChangeAspect="1"/>
-          </p:cNvPicPr>
+          <p:cNvSpPr txBox="1"/>
           <p:nvPr/>
-        </p:nvPicPr>
-        <p:blipFill>
-          <a:blip r:embed="rId3"/>
-          <a:stretch>
-            <a:fillRect/>
-          </a:stretch>
-        </p:blipFill>
-        <p:spPr>
-          <a:xfrm>
-            <a:off x="266262" y="1685945"/>
-            <a:ext cx="3175000" cy="1778000"/>
+        </p:nvSpPr>
+        <p:spPr>
+          <a:xfrm>
+            <a:off x="4838700" y="3105834"/>
+            <a:ext cx="4039038" cy="646331"/>
           </a:xfrm>
           <a:prstGeom prst="rect">
             <a:avLst/>
           </a:prstGeom>
-          <a:ln>
-            <a:solidFill>
-              <a:schemeClr val="tx2"/>
-            </a:solidFill>
-          </a:ln>
-        </p:spPr>
-      </p:pic>
-      <p:pic>
-        <p:nvPicPr>
-          <p:cNvPr id="13" name="Picture 12">
-            <a:extLst>
-              <a:ext uri="{FF2B5EF4-FFF2-40B4-BE49-F238E27FC236}">
-                <a16:creationId xmlns:a16="http://schemas.microsoft.com/office/drawing/2014/main" id="{4F46441A-0334-2B41-A706-7D9973608BED}"/>
-              </a:ext>
-            </a:extLst>
-          </p:cNvPr>
-          <p:cNvPicPr>
-            <a:picLocks noChangeAspect="1"/>
-          </p:cNvPicPr>
-          <p:nvPr/>
-        </p:nvPicPr>
-        <p:blipFill>
-          <a:blip r:embed="rId4"/>
-          <a:stretch>
-            <a:fillRect/>
-          </a:stretch>
-        </p:blipFill>
-        <p:spPr>
-          <a:xfrm>
-            <a:off x="1098550" y="3095171"/>
-            <a:ext cx="3175000" cy="2565400"/>
-          </a:xfrm>
-          <a:prstGeom prst="rect">
-            <a:avLst/>
-          </a:prstGeom>
-          <a:ln>
-            <a:solidFill>
-              <a:schemeClr val="tx2"/>
-            </a:solidFill>
-          </a:ln>
-        </p:spPr>
-      </p:pic>
-      <p:pic>
-        <p:nvPicPr>
-          <p:cNvPr id="14" name="Picture 13">
-            <a:extLst>
-              <a:ext uri="{FF2B5EF4-FFF2-40B4-BE49-F238E27FC236}">
-                <a16:creationId xmlns:a16="http://schemas.microsoft.com/office/drawing/2014/main" id="{9C8D60D5-DF7F-4A48-9913-5321D40FF944}"/>
-              </a:ext>
-            </a:extLst>
-          </p:cNvPr>
-          <p:cNvPicPr>
-            <a:picLocks noChangeAspect="1"/>
-          </p:cNvPicPr>
-          <p:nvPr/>
-        </p:nvPicPr>
-        <p:blipFill>
-          <a:blip r:embed="rId5"/>
-          <a:stretch>
-            <a:fillRect/>
-          </a:stretch>
-        </p:blipFill>
-        <p:spPr>
-          <a:xfrm>
-            <a:off x="5829300" y="2621416"/>
-            <a:ext cx="3175000" cy="3213100"/>
-          </a:xfrm>
-          <a:prstGeom prst="rect">
-            <a:avLst/>
-          </a:prstGeom>
-          <a:ln>
-            <a:solidFill>
-              <a:schemeClr val="tx2"/>
-            </a:solidFill>
-          </a:ln>
-        </p:spPr>
-      </p:pic>
+          <a:noFill/>
+        </p:spPr>
+        <p:txBody>
+          <a:bodyPr wrap="square" rtlCol="0">
+            <a:spAutoFit/>
+          </a:bodyPr>
+          <a:lstStyle/>
+          <a:p>
+            <a:r>
+              <a:rPr lang="en-US" dirty="0"/>
+              <a:t>Can text be a leading indicator to market conditions?</a:t>
+            </a:r>
+          </a:p>
+        </p:txBody>
+      </p:sp>
     </p:spTree>
     <p:extLst>
       <p:ext uri="{BB962C8B-B14F-4D97-AF65-F5344CB8AC3E}">
@@ -8515,6 +8113,78 @@
                                           </p:stCondLst>
                                         </p:cTn>
                                         <p:tgtEl>
+                                          <p:spTgt spid="6"/>
+                                        </p:tgtEl>
+                                        <p:attrNameLst>
+                                          <p:attrName>style.visibility</p:attrName>
+                                        </p:attrNameLst>
+                                      </p:cBhvr>
+                                      <p:to>
+                                        <p:strVal val="visible"/>
+                                      </p:to>
+                                    </p:set>
+                                  </p:childTnLst>
+                                </p:cTn>
+                              </p:par>
+                              <p:par>
+                                <p:cTn id="7" presetID="1" presetClass="entr" presetSubtype="0" fill="hold" grpId="0" nodeType="withEffect">
+                                  <p:stCondLst>
+                                    <p:cond delay="0"/>
+                                  </p:stCondLst>
+                                  <p:childTnLst>
+                                    <p:set>
+                                      <p:cBhvr>
+                                        <p:cTn id="8" dur="1" fill="hold">
+                                          <p:stCondLst>
+                                            <p:cond delay="0"/>
+                                          </p:stCondLst>
+                                        </p:cTn>
+                                        <p:tgtEl>
+                                          <p:spTgt spid="8"/>
+                                        </p:tgtEl>
+                                        <p:attrNameLst>
+                                          <p:attrName>style.visibility</p:attrName>
+                                        </p:attrNameLst>
+                                      </p:cBhvr>
+                                      <p:to>
+                                        <p:strVal val="visible"/>
+                                      </p:to>
+                                    </p:set>
+                                  </p:childTnLst>
+                                </p:cTn>
+                              </p:par>
+                            </p:childTnLst>
+                          </p:cTn>
+                        </p:par>
+                      </p:childTnLst>
+                    </p:cTn>
+                  </p:par>
+                  <p:par>
+                    <p:cTn id="9" fill="hold">
+                      <p:stCondLst>
+                        <p:cond delay="indefinite"/>
+                      </p:stCondLst>
+                      <p:childTnLst>
+                        <p:par>
+                          <p:cTn id="10" fill="hold">
+                            <p:stCondLst>
+                              <p:cond delay="0"/>
+                            </p:stCondLst>
+                            <p:childTnLst>
+                              <p:par>
+                                <p:cTn id="11" presetID="1" presetClass="entr" presetSubtype="0" fill="hold" grpId="0" nodeType="clickEffect">
+                                  <p:stCondLst>
+                                    <p:cond delay="0"/>
+                                  </p:stCondLst>
+                                  <p:childTnLst>
+                                    <p:set>
+                                      <p:cBhvr>
+                                        <p:cTn id="12" dur="1" fill="hold">
+                                          <p:stCondLst>
+                                            <p:cond delay="0"/>
+                                          </p:stCondLst>
+                                        </p:cTn>
+                                        <p:tgtEl>
                                           <p:spTgt spid="7"/>
                                         </p:tgtEl>
                                         <p:attrNameLst>
@@ -8529,47 +8199,20 @@
                                 </p:cTn>
                               </p:par>
                               <p:par>
-                                <p:cTn id="7" presetID="1" presetClass="entr" presetSubtype="0" fill="hold" nodeType="withEffect">
+                                <p:cTn id="13" presetID="1" presetClass="entr" presetSubtype="0" fill="hold" grpId="0" nodeType="withEffect">
                                   <p:stCondLst>
                                     <p:cond delay="0"/>
                                   </p:stCondLst>
                                   <p:childTnLst>
                                     <p:set>
                                       <p:cBhvr>
-                                        <p:cTn id="8" dur="1" fill="hold">
+                                        <p:cTn id="14" dur="1" fill="hold">
                                           <p:stCondLst>
                                             <p:cond delay="0"/>
                                           </p:stCondLst>
                                         </p:cTn>
                                         <p:tgtEl>
-                                          <p:spTgt spid="11"/>
-                                        </p:tgtEl>
-                                        <p:attrNameLst>
-                                          <p:attrName>style.visibility</p:attrName>
-                                        </p:attrNameLst>
-                                      </p:cBhvr>
-                                      <p:to>
-                                        <p:strVal val="visible"/>
-                                      </p:to>
-                                    </p:set>
-                                  </p:childTnLst>
-                                </p:cTn>
-                              </p:par>
-                              <p:par>
-                                <p:cTn id="9" presetID="1" presetClass="entr" presetSubtype="0" fill="hold" nodeType="withEffect">
-                                  <p:stCondLst>
-                                    <p:cond delay="0"/>
-                                  </p:stCondLst>
-                                  <p:childTnLst>
-                                    <p:set>
-                                      <p:cBhvr>
-                                        <p:cTn id="10" dur="1" fill="hold">
-                                          <p:stCondLst>
-                                            <p:cond delay="0"/>
-                                          </p:stCondLst>
-                                        </p:cTn>
-                                        <p:tgtEl>
-                                          <p:spTgt spid="14"/>
+                                          <p:spTgt spid="15"/>
                                         </p:tgtEl>
                                         <p:attrNameLst>
                                           <p:attrName>style.visibility</p:attrName>
@@ -8610,7 +8253,10 @@
       </p:par>
     </p:tnLst>
     <p:bldLst>
+      <p:bldP spid="6" grpId="0" animBg="1"/>
       <p:bldP spid="7" grpId="0" animBg="1"/>
+      <p:bldP spid="8" grpId="0"/>
+      <p:bldP spid="15" grpId="0"/>
     </p:bldLst>
   </p:timing>
 </p:sld>

</xml_diff>